<commit_message>
Added unmatched label example to counting-mismatches.Rmd
</commit_message>
<xml_diff>
--- a/src/counting-mismatches.pptx
+++ b/src/counting-mismatches.pptx
@@ -5,7 +5,7 @@
     <p:sldMasterId id="2147483648" r:id="rId1"/>
   </p:sldMasterIdLst>
   <p:notesMasterIdLst>
-    <p:NotesMasterId r:id="rId20"/>
+    <p:NotesMasterId r:id="rId23"/>
   </p:notesMasterIdLst>
   <p:sldIdLst>
     <p:sldId id="256" r:id="rId2"/>
@@ -26,6 +26,9 @@
     <p:sldId id="271" r:id="rId17"/>
     <p:sldId id="272" r:id="rId18"/>
     <p:sldId id="273" r:id="rId19"/>
+    <p:sldId id="274" r:id="rId20"/>
+    <p:sldId id="275" r:id="rId21"/>
+    <p:sldId id="276" r:id="rId22"/>
   </p:sldIdLst>
   <p:sldSz cx="9144000" cy="6858000" type="screen4x3"/>
   <p:notesSz cx="6858000" cy="9144000"/>
@@ -2086,47 +2089,119 @@
             </a:r>
             <a:r>
               <a:rPr/>
-              <a:t>compute</a:t>
-            </a:r>
-            <a:r>
-              <a:rPr/>
-              <a:t> </a:t>
-            </a:r>
-            <a:r>
-              <a:rPr/>
-              <a:t>values</a:t>
-            </a:r>
-            <a:r>
-              <a:rPr/>
-              <a:t> </a:t>
-            </a:r>
-            <a:r>
-              <a:rPr/>
-              <a:t>across</a:t>
-            </a:r>
-            <a:r>
-              <a:rPr/>
-              <a:t> </a:t>
-            </a:r>
-            <a:r>
-              <a:rPr/>
-              <a:t>different</a:t>
-            </a:r>
-            <a:r>
-              <a:rPr/>
-              <a:t> </a:t>
-            </a:r>
-            <a:r>
-              <a:rPr/>
-              <a:t>tables.</a:t>
-            </a:r>
-            <a:r>
-              <a:rPr/>
-              <a:t> </a:t>
-            </a:r>
-            <a:r>
-              <a:rPr/>
-              <a:t>This</a:t>
+              <a:t>use</a:t>
+            </a:r>
+            <a:r>
+              <a:rPr/>
+              <a:t> </a:t>
+            </a:r>
+            <a:r>
+              <a:rPr/>
+              <a:t>the</a:t>
+            </a:r>
+            <a:r>
+              <a:rPr/>
+              <a:t> </a:t>
+            </a:r>
+            <a:r>
+              <a:rPr/>
+              <a:t>same</a:t>
+            </a:r>
+            <a:r>
+              <a:rPr/>
+              <a:t> </a:t>
+            </a:r>
+            <a:r>
+              <a:rPr/>
+              <a:t>approach</a:t>
+            </a:r>
+            <a:r>
+              <a:rPr/>
+              <a:t> </a:t>
+            </a:r>
+            <a:r>
+              <a:rPr/>
+              <a:t>to</a:t>
+            </a:r>
+            <a:r>
+              <a:rPr/>
+              <a:t> </a:t>
+            </a:r>
+            <a:r>
+              <a:rPr/>
+              <a:t>look</a:t>
+            </a:r>
+            <a:r>
+              <a:rPr/>
+              <a:t> </a:t>
+            </a:r>
+            <a:r>
+              <a:rPr/>
+              <a:t>for</a:t>
+            </a:r>
+            <a:r>
+              <a:rPr/>
+              <a:t> </a:t>
+            </a:r>
+            <a:r>
+              <a:rPr/>
+              <a:t>unmatched</a:t>
+            </a:r>
+            <a:r>
+              <a:rPr/>
+              <a:t> </a:t>
+            </a:r>
+            <a:r>
+              <a:rPr/>
+              <a:t>labels</a:t>
+            </a:r>
+            <a:r>
+              <a:rPr/>
+              <a:t> </a:t>
+            </a:r>
+            <a:r>
+              <a:rPr/>
+              <a:t>or</a:t>
+            </a:r>
+            <a:r>
+              <a:rPr/>
+              <a:t> </a:t>
+            </a:r>
+            <a:r>
+              <a:rPr/>
+              <a:t>unmatched</a:t>
+            </a:r>
+            <a:r>
+              <a:rPr/>
+              <a:t> </a:t>
+            </a:r>
+            <a:r>
+              <a:rPr/>
+              <a:t>codes.</a:t>
+            </a:r>
+            <a:r>
+              <a:rPr/>
+              <a:t> </a:t>
+            </a:r>
+            <a:r>
+              <a:rPr/>
+              <a:t>Here</a:t>
+            </a:r>
+            <a:r>
+              <a:rPr/>
+              <a:t> </a:t>
+            </a:r>
+            <a:r>
+              <a:rPr/>
+              <a:t>is</a:t>
+            </a:r>
+            <a:r>
+              <a:rPr/>
+              <a:t> </a:t>
+            </a:r>
+            <a:r>
+              <a:rPr/>
+              <a:t>ab</a:t>
             </a:r>
             <a:r>
               <a:rPr/>
@@ -2142,127 +2217,39 @@
             </a:r>
             <a:r>
               <a:rPr/>
-              <a:t>shows</a:t>
-            </a:r>
-            <a:r>
-              <a:rPr/>
-              <a:t> </a:t>
-            </a:r>
-            <a:r>
-              <a:rPr/>
-              <a:t>a</a:t>
-            </a:r>
-            <a:r>
-              <a:rPr/>
-              <a:t> </a:t>
-            </a:r>
-            <a:r>
-              <a:rPr/>
-              <a:t>change</a:t>
-            </a:r>
-            <a:r>
-              <a:rPr/>
-              <a:t> </a:t>
-            </a:r>
-            <a:r>
-              <a:rPr/>
-              <a:t>score.</a:t>
-            </a:r>
-            <a:r>
-              <a:rPr/>
-              <a:t> </a:t>
-            </a:r>
-            <a:r>
-              <a:rPr/>
-              <a:t>Notice</a:t>
-            </a:r>
-            <a:r>
-              <a:rPr/>
-              <a:t> </a:t>
-            </a:r>
-            <a:r>
-              <a:rPr/>
-              <a:t>that</a:t>
-            </a:r>
-            <a:r>
-              <a:rPr/>
-              <a:t> </a:t>
-            </a:r>
-            <a:r>
-              <a:rPr/>
-              <a:t>the</a:t>
-            </a:r>
-            <a:r>
-              <a:rPr/>
-              <a:t> </a:t>
-            </a:r>
-            <a:r>
-              <a:rPr/>
-              <a:t>change</a:t>
-            </a:r>
-            <a:r>
-              <a:rPr/>
-              <a:t> </a:t>
-            </a:r>
-            <a:r>
-              <a:rPr/>
-              <a:t>score</a:t>
-            </a:r>
-            <a:r>
-              <a:rPr/>
-              <a:t> </a:t>
-            </a:r>
-            <a:r>
-              <a:rPr/>
-              <a:t>is</a:t>
-            </a:r>
-            <a:r>
-              <a:rPr/>
-              <a:t> </a:t>
-            </a:r>
-            <a:r>
-              <a:rPr/>
-              <a:t>null</a:t>
-            </a:r>
-            <a:r>
-              <a:rPr/>
-              <a:t> </a:t>
-            </a:r>
-            <a:r>
-              <a:rPr/>
-              <a:t>if</a:t>
-            </a:r>
-            <a:r>
-              <a:rPr/>
-              <a:t> </a:t>
-            </a:r>
-            <a:r>
-              <a:rPr/>
-              <a:t>either</a:t>
-            </a:r>
-            <a:r>
-              <a:rPr/>
-              <a:t> </a:t>
-            </a:r>
-            <a:r>
-              <a:rPr/>
-              <a:t>value</a:t>
-            </a:r>
-            <a:r>
-              <a:rPr/>
-              <a:t> </a:t>
-            </a:r>
-            <a:r>
-              <a:rPr/>
-              <a:t>is</a:t>
-            </a:r>
-            <a:r>
-              <a:rPr/>
-              <a:t> </a:t>
-            </a:r>
-            <a:r>
-              <a:rPr/>
-              <a:t>null.</a:t>
+              <a:t>of</a:t>
+            </a:r>
+            <a:r>
+              <a:rPr/>
+              <a:t> </a:t>
+            </a:r>
+            <a:r>
+              <a:rPr/>
+              <a:t>looking</a:t>
+            </a:r>
+            <a:r>
+              <a:rPr/>
+              <a:t> </a:t>
+            </a:r>
+            <a:r>
+              <a:rPr/>
+              <a:t>for</a:t>
+            </a:r>
+            <a:r>
+              <a:rPr/>
+              <a:t> </a:t>
+            </a:r>
+            <a:r>
+              <a:rPr/>
+              <a:t>unmatched</a:t>
+            </a:r>
+            <a:r>
+              <a:rPr/>
+              <a:t> </a:t>
+            </a:r>
+            <a:r>
+              <a:rPr/>
+              <a:t>labels.</a:t>
             </a:r>
           </a:p>
         </p:txBody>
@@ -2344,7 +2331,159 @@
             </a:pPr>
             <a:r>
               <a:rPr/>
-              <a:t>You</a:t>
+              <a:t>By</a:t>
+            </a:r>
+            <a:r>
+              <a:rPr/>
+              <a:t> </a:t>
+            </a:r>
+            <a:r>
+              <a:rPr/>
+              <a:t>swapping</a:t>
+            </a:r>
+            <a:r>
+              <a:rPr/>
+              <a:t> </a:t>
+            </a:r>
+            <a:r>
+              <a:rPr/>
+              <a:t>the</a:t>
+            </a:r>
+            <a:r>
+              <a:rPr/>
+              <a:t> </a:t>
+            </a:r>
+            <a:r>
+              <a:rPr/>
+              <a:t>order</a:t>
+            </a:r>
+            <a:r>
+              <a:rPr/>
+              <a:t> </a:t>
+            </a:r>
+            <a:r>
+              <a:rPr/>
+              <a:t>of</a:t>
+            </a:r>
+            <a:r>
+              <a:rPr/>
+              <a:t> </a:t>
+            </a:r>
+            <a:r>
+              <a:rPr/>
+              <a:t>tables</a:t>
+            </a:r>
+            <a:r>
+              <a:rPr/>
+              <a:t> </a:t>
+            </a:r>
+            <a:r>
+              <a:rPr/>
+              <a:t>(or</a:t>
+            </a:r>
+            <a:r>
+              <a:rPr/>
+              <a:t> </a:t>
+            </a:r>
+            <a:r>
+              <a:rPr/>
+              <a:t>changing</a:t>
+            </a:r>
+            <a:r>
+              <a:rPr/>
+              <a:t> </a:t>
+            </a:r>
+            <a:r>
+              <a:rPr/>
+              <a:t>to</a:t>
+            </a:r>
+            <a:r>
+              <a:rPr/>
+              <a:t> </a:t>
+            </a:r>
+            <a:r>
+              <a:rPr/>
+              <a:t>a</a:t>
+            </a:r>
+            <a:r>
+              <a:rPr/>
+              <a:t> </a:t>
+            </a:r>
+            <a:r>
+              <a:rPr/>
+              <a:t>right</a:t>
+            </a:r>
+            <a:r>
+              <a:rPr/>
+              <a:t> </a:t>
+            </a:r>
+            <a:r>
+              <a:rPr/>
+              <a:t>join)</a:t>
+            </a:r>
+            <a:r>
+              <a:rPr/>
+              <a:t> </a:t>
+            </a:r>
+            <a:r>
+              <a:rPr/>
+              <a:t>and</a:t>
+            </a:r>
+            <a:r>
+              <a:rPr/>
+              <a:t> </a:t>
+            </a:r>
+            <a:r>
+              <a:rPr/>
+              <a:t>making</a:t>
+            </a:r>
+            <a:r>
+              <a:rPr/>
+              <a:t> </a:t>
+            </a:r>
+            <a:r>
+              <a:rPr/>
+              <a:t>a</a:t>
+            </a:r>
+            <a:r>
+              <a:rPr/>
+              <a:t> </a:t>
+            </a:r>
+            <a:r>
+              <a:rPr/>
+              <a:t>few</a:t>
+            </a:r>
+            <a:r>
+              <a:rPr/>
+              <a:t> </a:t>
+            </a:r>
+            <a:r>
+              <a:rPr/>
+              <a:t>other</a:t>
+            </a:r>
+            <a:r>
+              <a:rPr/>
+              <a:t> </a:t>
+            </a:r>
+            <a:r>
+              <a:rPr/>
+              <a:t>small</a:t>
+            </a:r>
+            <a:r>
+              <a:rPr/>
+              <a:t> </a:t>
+            </a:r>
+            <a:r>
+              <a:rPr/>
+              <a:t>changes,</a:t>
+            </a:r>
+            <a:r>
+              <a:rPr/>
+              <a:t> </a:t>
+            </a:r>
+            <a:r>
+              <a:rPr/>
+              <a:t>you</a:t>
             </a:r>
             <a:r>
               <a:rPr/>
@@ -2360,39 +2499,47 @@
             </a:r>
             <a:r>
               <a:rPr/>
-              <a:t>even</a:t>
-            </a:r>
-            <a:r>
-              <a:rPr/>
-              <a:t> </a:t>
-            </a:r>
-            <a:r>
-              <a:rPr/>
-              <a:t>average</a:t>
-            </a:r>
-            <a:r>
-              <a:rPr/>
-              <a:t> </a:t>
-            </a:r>
-            <a:r>
-              <a:rPr/>
-              <a:t>these</a:t>
-            </a:r>
-            <a:r>
-              <a:rPr/>
-              <a:t> </a:t>
-            </a:r>
-            <a:r>
-              <a:rPr/>
-              <a:t>values.</a:t>
-            </a:r>
-            <a:r>
-              <a:rPr/>
-              <a:t> </a:t>
-            </a:r>
-            <a:r>
-              <a:rPr/>
-              <a:t>Notice</a:t>
+              <a:t>find</a:t>
+            </a:r>
+            <a:r>
+              <a:rPr/>
+              <a:t> </a:t>
+            </a:r>
+            <a:r>
+              <a:rPr/>
+              <a:t>codes</a:t>
+            </a:r>
+            <a:r>
+              <a:rPr/>
+              <a:t> </a:t>
+            </a:r>
+            <a:r>
+              <a:rPr/>
+              <a:t>in</a:t>
+            </a:r>
+            <a:r>
+              <a:rPr/>
+              <a:t> </a:t>
+            </a:r>
+            <a:r>
+              <a:rPr/>
+              <a:t>the</a:t>
+            </a:r>
+            <a:r>
+              <a:rPr/>
+              <a:t> </a:t>
+            </a:r>
+            <a:r>
+              <a:rPr/>
+              <a:t>demography</a:t>
+            </a:r>
+            <a:r>
+              <a:rPr/>
+              <a:t> </a:t>
+            </a:r>
+            <a:r>
+              <a:rPr/>
+              <a:t>database</a:t>
             </a:r>
             <a:r>
               <a:rPr/>
@@ -2408,31 +2555,7 @@
             </a:r>
             <a:r>
               <a:rPr/>
-              <a:t>the</a:t>
-            </a:r>
-            <a:r>
-              <a:rPr/>
-              <a:t> </a:t>
-            </a:r>
-            <a:r>
-              <a:rPr/>
-              <a:t>mean</a:t>
-            </a:r>
-            <a:r>
-              <a:rPr/>
-              <a:t> </a:t>
-            </a:r>
-            <a:r>
-              <a:rPr/>
-              <a:t>change</a:t>
-            </a:r>
-            <a:r>
-              <a:rPr/>
-              <a:t> </a:t>
-            </a:r>
-            <a:r>
-              <a:rPr/>
-              <a:t>is</a:t>
+              <a:t>do</a:t>
             </a:r>
             <a:r>
               <a:rPr/>
@@ -2448,231 +2571,7 @@
             </a:r>
             <a:r>
               <a:rPr/>
-              <a:t>exactly</a:t>
-            </a:r>
-            <a:r>
-              <a:rPr/>
-              <a:t> </a:t>
-            </a:r>
-            <a:r>
-              <a:rPr/>
-              <a:t>equal</a:t>
-            </a:r>
-            <a:r>
-              <a:rPr/>
-              <a:t> </a:t>
-            </a:r>
-            <a:r>
-              <a:rPr/>
-              <a:t>to</a:t>
-            </a:r>
-            <a:r>
-              <a:rPr/>
-              <a:t> </a:t>
-            </a:r>
-            <a:r>
-              <a:rPr/>
-              <a:t>the</a:t>
-            </a:r>
-            <a:r>
-              <a:rPr/>
-              <a:t> </a:t>
-            </a:r>
-            <a:r>
-              <a:rPr/>
-              <a:t>difference</a:t>
-            </a:r>
-            <a:r>
-              <a:rPr/>
-              <a:t> </a:t>
-            </a:r>
-            <a:r>
-              <a:rPr/>
-              <a:t>in</a:t>
-            </a:r>
-            <a:r>
-              <a:rPr/>
-              <a:t> </a:t>
-            </a:r>
-            <a:r>
-              <a:rPr/>
-              <a:t>the</a:t>
-            </a:r>
-            <a:r>
-              <a:rPr/>
-              <a:t> </a:t>
-            </a:r>
-            <a:r>
-              <a:rPr/>
-              <a:t>two</a:t>
-            </a:r>
-            <a:r>
-              <a:rPr/>
-              <a:t> </a:t>
-            </a:r>
-            <a:r>
-              <a:rPr/>
-              <a:t>means.</a:t>
-            </a:r>
-            <a:r>
-              <a:rPr/>
-              <a:t> </a:t>
-            </a:r>
-            <a:r>
-              <a:rPr/>
-              <a:t>That</a:t>
-            </a:r>
-            <a:r>
-              <a:rPr/>
-              <a:t> </a:t>
-            </a:r>
-            <a:r>
-              <a:rPr/>
-              <a:t>would</a:t>
-            </a:r>
-            <a:r>
-              <a:rPr/>
-              <a:t> </a:t>
-            </a:r>
-            <a:r>
-              <a:rPr/>
-              <a:t>normally</a:t>
-            </a:r>
-            <a:r>
-              <a:rPr/>
-              <a:t> </a:t>
-            </a:r>
-            <a:r>
-              <a:rPr/>
-              <a:t>be</a:t>
-            </a:r>
-            <a:r>
-              <a:rPr/>
-              <a:t> </a:t>
-            </a:r>
-            <a:r>
-              <a:rPr/>
-              <a:t>the</a:t>
-            </a:r>
-            <a:r>
-              <a:rPr/>
-              <a:t> </a:t>
-            </a:r>
-            <a:r>
-              <a:rPr/>
-              <a:t>case,</a:t>
-            </a:r>
-            <a:r>
-              <a:rPr/>
-              <a:t> </a:t>
-            </a:r>
-            <a:r>
-              <a:rPr/>
-              <a:t>but</a:t>
-            </a:r>
-            <a:r>
-              <a:rPr/>
-              <a:t> </a:t>
-            </a:r>
-            <a:r>
-              <a:rPr/>
-              <a:t>remember</a:t>
-            </a:r>
-            <a:r>
-              <a:rPr/>
-              <a:t> </a:t>
-            </a:r>
-            <a:r>
-              <a:rPr/>
-              <a:t>that</a:t>
-            </a:r>
-            <a:r>
-              <a:rPr/>
-              <a:t> </a:t>
-            </a:r>
-            <a:r>
-              <a:rPr/>
-              <a:t>the</a:t>
-            </a:r>
-            <a:r>
-              <a:rPr/>
-              <a:t> </a:t>
-            </a:r>
-            <a:r>
-              <a:rPr/>
-              <a:t>baseline</a:t>
-            </a:r>
-            <a:r>
-              <a:rPr/>
-              <a:t> </a:t>
-            </a:r>
-            <a:r>
-              <a:rPr/>
-              <a:t>average</a:t>
-            </a:r>
-            <a:r>
-              <a:rPr/>
-              <a:t> </a:t>
-            </a:r>
-            <a:r>
-              <a:rPr/>
-              <a:t>is</a:t>
-            </a:r>
-            <a:r>
-              <a:rPr/>
-              <a:t> </a:t>
-            </a:r>
-            <a:r>
-              <a:rPr/>
-              <a:t>an</a:t>
-            </a:r>
-            <a:r>
-              <a:rPr/>
-              <a:t> </a:t>
-            </a:r>
-            <a:r>
-              <a:rPr/>
-              <a:t>average</a:t>
-            </a:r>
-            <a:r>
-              <a:rPr/>
-              <a:t> </a:t>
-            </a:r>
-            <a:r>
-              <a:rPr/>
-              <a:t>that</a:t>
-            </a:r>
-            <a:r>
-              <a:rPr/>
-              <a:t> </a:t>
-            </a:r>
-            <a:r>
-              <a:rPr/>
-              <a:t>includes</a:t>
-            </a:r>
-            <a:r>
-              <a:rPr/>
-              <a:t> </a:t>
-            </a:r>
-            <a:r>
-              <a:rPr/>
-              <a:t>75</a:t>
-            </a:r>
-            <a:r>
-              <a:rPr/>
-              <a:t> </a:t>
-            </a:r>
-            <a:r>
-              <a:rPr/>
-              <a:t>patients</a:t>
-            </a:r>
-            <a:r>
-              <a:rPr/>
-              <a:t> </a:t>
-            </a:r>
-            <a:r>
-              <a:rPr/>
-              <a:t>wihtout</a:t>
+              <a:t>have</a:t>
             </a:r>
             <a:r>
               <a:rPr/>
@@ -2696,367 +2595,7 @@
             </a:r>
             <a:r>
               <a:rPr/>
-              <a:t>three</a:t>
-            </a:r>
-            <a:r>
-              <a:rPr/>
-              <a:t> </a:t>
-            </a:r>
-            <a:r>
-              <a:rPr/>
-              <a:t>month</a:t>
-            </a:r>
-            <a:r>
-              <a:rPr/>
-              <a:t> </a:t>
-            </a:r>
-            <a:r>
-              <a:rPr/>
-              <a:t>value.</a:t>
-            </a:r>
-            <a:r>
-              <a:rPr/>
-              <a:t> </a:t>
-            </a:r>
-            <a:r>
-              <a:rPr/>
-              <a:t>You</a:t>
-            </a:r>
-            <a:r>
-              <a:rPr/>
-              <a:t> </a:t>
-            </a:r>
-            <a:r>
-              <a:rPr/>
-              <a:t>could</a:t>
-            </a:r>
-            <a:r>
-              <a:rPr/>
-              <a:t> </a:t>
-            </a:r>
-            <a:r>
-              <a:rPr/>
-              <a:t>restrict</a:t>
-            </a:r>
-            <a:r>
-              <a:rPr/>
-              <a:t> </a:t>
-            </a:r>
-            <a:r>
-              <a:rPr/>
-              <a:t>the</a:t>
-            </a:r>
-            <a:r>
-              <a:rPr/>
-              <a:t> </a:t>
-            </a:r>
-            <a:r>
-              <a:rPr/>
-              <a:t>data</a:t>
-            </a:r>
-            <a:r>
-              <a:rPr/>
-              <a:t> </a:t>
-            </a:r>
-            <a:r>
-              <a:rPr/>
-              <a:t>so</a:t>
-            </a:r>
-            <a:r>
-              <a:rPr/>
-              <a:t> </a:t>
-            </a:r>
-            <a:r>
-              <a:rPr/>
-              <a:t>that</a:t>
-            </a:r>
-            <a:r>
-              <a:rPr/>
-              <a:t> </a:t>
-            </a:r>
-            <a:r>
-              <a:rPr/>
-              <a:t>the</a:t>
-            </a:r>
-            <a:r>
-              <a:rPr/>
-              <a:t> </a:t>
-            </a:r>
-            <a:r>
-              <a:rPr/>
-              <a:t>baseline</a:t>
-            </a:r>
-            <a:r>
-              <a:rPr/>
-              <a:t> </a:t>
-            </a:r>
-            <a:r>
-              <a:rPr/>
-              <a:t>average</a:t>
-            </a:r>
-            <a:r>
-              <a:rPr/>
-              <a:t> </a:t>
-            </a:r>
-            <a:r>
-              <a:rPr/>
-              <a:t>is</a:t>
-            </a:r>
-            <a:r>
-              <a:rPr/>
-              <a:t> </a:t>
-            </a:r>
-            <a:r>
-              <a:rPr/>
-              <a:t>only</a:t>
-            </a:r>
-            <a:r>
-              <a:rPr/>
-              <a:t> </a:t>
-            </a:r>
-            <a:r>
-              <a:rPr/>
-              <a:t>computed</a:t>
-            </a:r>
-            <a:r>
-              <a:rPr/>
-              <a:t> </a:t>
-            </a:r>
-            <a:r>
-              <a:rPr/>
-              <a:t>for</a:t>
-            </a:r>
-            <a:r>
-              <a:rPr/>
-              <a:t> </a:t>
-            </a:r>
-            <a:r>
-              <a:rPr/>
-              <a:t>those</a:t>
-            </a:r>
-            <a:r>
-              <a:rPr/>
-              <a:t> </a:t>
-            </a:r>
-            <a:r>
-              <a:rPr/>
-              <a:t>patients</a:t>
-            </a:r>
-            <a:r>
-              <a:rPr/>
-              <a:t> </a:t>
-            </a:r>
-            <a:r>
-              <a:rPr/>
-              <a:t>who</a:t>
-            </a:r>
-            <a:r>
-              <a:rPr/>
-              <a:t> </a:t>
-            </a:r>
-            <a:r>
-              <a:rPr/>
-              <a:t>have</a:t>
-            </a:r>
-            <a:r>
-              <a:rPr/>
-              <a:t> </a:t>
-            </a:r>
-            <a:r>
-              <a:rPr/>
-              <a:t>a</a:t>
-            </a:r>
-            <a:r>
-              <a:rPr/>
-              <a:t> </a:t>
-            </a:r>
-            <a:r>
-              <a:rPr/>
-              <a:t>matching</a:t>
-            </a:r>
-            <a:r>
-              <a:rPr/>
-              <a:t> </a:t>
-            </a:r>
-            <a:r>
-              <a:rPr/>
-              <a:t>three</a:t>
-            </a:r>
-            <a:r>
-              <a:rPr/>
-              <a:t> </a:t>
-            </a:r>
-            <a:r>
-              <a:rPr/>
-              <a:t>month</a:t>
-            </a:r>
-            <a:r>
-              <a:rPr/>
-              <a:t> </a:t>
-            </a:r>
-            <a:r>
-              <a:rPr/>
-              <a:t>value.</a:t>
-            </a:r>
-            <a:r>
-              <a:rPr/>
-              <a:t> </a:t>
-            </a:r>
-            <a:r>
-              <a:rPr/>
-              <a:t>You</a:t>
-            </a:r>
-            <a:r>
-              <a:rPr/>
-              <a:t> </a:t>
-            </a:r>
-            <a:r>
-              <a:rPr/>
-              <a:t>could</a:t>
-            </a:r>
-            <a:r>
-              <a:rPr/>
-              <a:t> </a:t>
-            </a:r>
-            <a:r>
-              <a:rPr/>
-              <a:t>do</a:t>
-            </a:r>
-            <a:r>
-              <a:rPr/>
-              <a:t> </a:t>
-            </a:r>
-            <a:r>
-              <a:rPr/>
-              <a:t>this</a:t>
-            </a:r>
-            <a:r>
-              <a:rPr/>
-              <a:t> </a:t>
-            </a:r>
-            <a:r>
-              <a:rPr/>
-              <a:t>using</a:t>
-            </a:r>
-            <a:r>
-              <a:rPr/>
-              <a:t> </a:t>
-            </a:r>
-            <a:r>
-              <a:rPr/>
-              <a:t>an</a:t>
-            </a:r>
-            <a:r>
-              <a:rPr/>
-              <a:t> </a:t>
-            </a:r>
-            <a:r>
-              <a:rPr/>
-              <a:t>inner</a:t>
-            </a:r>
-            <a:r>
-              <a:rPr/>
-              <a:t> </a:t>
-            </a:r>
-            <a:r>
-              <a:rPr/>
-              <a:t>join</a:t>
-            </a:r>
-            <a:r>
-              <a:rPr/>
-              <a:t> </a:t>
-            </a:r>
-            <a:r>
-              <a:rPr/>
-              <a:t>or</a:t>
-            </a:r>
-            <a:r>
-              <a:rPr/>
-              <a:t> </a:t>
-            </a:r>
-            <a:r>
-              <a:rPr/>
-              <a:t>by</a:t>
-            </a:r>
-            <a:r>
-              <a:rPr/>
-              <a:t> </a:t>
-            </a:r>
-            <a:r>
-              <a:rPr/>
-              <a:t>restricting</a:t>
-            </a:r>
-            <a:r>
-              <a:rPr/>
-              <a:t> </a:t>
-            </a:r>
-            <a:r>
-              <a:rPr/>
-              <a:t>the</a:t>
-            </a:r>
-            <a:r>
-              <a:rPr/>
-              <a:t> </a:t>
-            </a:r>
-            <a:r>
-              <a:rPr/>
-              <a:t>data</a:t>
-            </a:r>
-            <a:r>
-              <a:rPr/>
-              <a:t> </a:t>
-            </a:r>
-            <a:r>
-              <a:rPr/>
-              <a:t>to</a:t>
-            </a:r>
-            <a:r>
-              <a:rPr/>
-              <a:t> </a:t>
-            </a:r>
-            <a:r>
-              <a:rPr/>
-              <a:t>cases</a:t>
-            </a:r>
-            <a:r>
-              <a:rPr/>
-              <a:t> </a:t>
-            </a:r>
-            <a:r>
-              <a:rPr/>
-              <a:t>where</a:t>
-            </a:r>
-            <a:r>
-              <a:rPr/>
-              <a:t> </a:t>
-            </a:r>
-            <a:r>
-              <a:rPr/>
-              <a:t>pk2</a:t>
-            </a:r>
-            <a:r>
-              <a:rPr/>
-              <a:t> </a:t>
-            </a:r>
-            <a:r>
-              <a:rPr/>
-              <a:t>is</a:t>
-            </a:r>
-            <a:r>
-              <a:rPr/>
-              <a:t> </a:t>
-            </a:r>
-            <a:r>
-              <a:rPr/>
-              <a:t>not</a:t>
-            </a:r>
-            <a:r>
-              <a:rPr/>
-              <a:t> </a:t>
-            </a:r>
-            <a:r>
-              <a:rPr/>
-              <a:t>null.</a:t>
+              <a:t>label.</a:t>
             </a:r>
           </a:p>
         </p:txBody>
@@ -3138,23 +2677,143 @@
             </a:pPr>
             <a:r>
               <a:rPr/>
-              <a:t>An</a:t>
-            </a:r>
-            <a:r>
-              <a:rPr/>
-              <a:t> </a:t>
-            </a:r>
-            <a:r>
-              <a:rPr/>
-              <a:t>important</a:t>
-            </a:r>
-            <a:r>
-              <a:rPr/>
-              <a:t> </a:t>
-            </a:r>
-            <a:r>
-              <a:rPr/>
-              <a:t>comparison</a:t>
+              <a:t>You</a:t>
+            </a:r>
+            <a:r>
+              <a:rPr/>
+              <a:t> </a:t>
+            </a:r>
+            <a:r>
+              <a:rPr/>
+              <a:t>can</a:t>
+            </a:r>
+            <a:r>
+              <a:rPr/>
+              <a:t> </a:t>
+            </a:r>
+            <a:r>
+              <a:rPr/>
+              <a:t>compute</a:t>
+            </a:r>
+            <a:r>
+              <a:rPr/>
+              <a:t> </a:t>
+            </a:r>
+            <a:r>
+              <a:rPr/>
+              <a:t>values</a:t>
+            </a:r>
+            <a:r>
+              <a:rPr/>
+              <a:t> </a:t>
+            </a:r>
+            <a:r>
+              <a:rPr/>
+              <a:t>across</a:t>
+            </a:r>
+            <a:r>
+              <a:rPr/>
+              <a:t> </a:t>
+            </a:r>
+            <a:r>
+              <a:rPr/>
+              <a:t>different</a:t>
+            </a:r>
+            <a:r>
+              <a:rPr/>
+              <a:t> </a:t>
+            </a:r>
+            <a:r>
+              <a:rPr/>
+              <a:t>tables.</a:t>
+            </a:r>
+            <a:r>
+              <a:rPr/>
+              <a:t> </a:t>
+            </a:r>
+            <a:r>
+              <a:rPr/>
+              <a:t>This</a:t>
+            </a:r>
+            <a:r>
+              <a:rPr/>
+              <a:t> </a:t>
+            </a:r>
+            <a:r>
+              <a:rPr/>
+              <a:t>example</a:t>
+            </a:r>
+            <a:r>
+              <a:rPr/>
+              <a:t> </a:t>
+            </a:r>
+            <a:r>
+              <a:rPr/>
+              <a:t>shows</a:t>
+            </a:r>
+            <a:r>
+              <a:rPr/>
+              <a:t> </a:t>
+            </a:r>
+            <a:r>
+              <a:rPr/>
+              <a:t>a</a:t>
+            </a:r>
+            <a:r>
+              <a:rPr/>
+              <a:t> </a:t>
+            </a:r>
+            <a:r>
+              <a:rPr/>
+              <a:t>change</a:t>
+            </a:r>
+            <a:r>
+              <a:rPr/>
+              <a:t> </a:t>
+            </a:r>
+            <a:r>
+              <a:rPr/>
+              <a:t>score.</a:t>
+            </a:r>
+            <a:r>
+              <a:rPr/>
+              <a:t> </a:t>
+            </a:r>
+            <a:r>
+              <a:rPr/>
+              <a:t>Notice</a:t>
+            </a:r>
+            <a:r>
+              <a:rPr/>
+              <a:t> </a:t>
+            </a:r>
+            <a:r>
+              <a:rPr/>
+              <a:t>that</a:t>
+            </a:r>
+            <a:r>
+              <a:rPr/>
+              <a:t> </a:t>
+            </a:r>
+            <a:r>
+              <a:rPr/>
+              <a:t>the</a:t>
+            </a:r>
+            <a:r>
+              <a:rPr/>
+              <a:t> </a:t>
+            </a:r>
+            <a:r>
+              <a:rPr/>
+              <a:t>change</a:t>
+            </a:r>
+            <a:r>
+              <a:rPr/>
+              <a:t> </a:t>
+            </a:r>
+            <a:r>
+              <a:rPr/>
+              <a:t>score</a:t>
             </a:r>
             <a:r>
               <a:rPr/>
@@ -3170,231 +2829,47 @@
             </a:r>
             <a:r>
               <a:rPr/>
-              <a:t>what</a:t>
-            </a:r>
-            <a:r>
-              <a:rPr/>
-              <a:t> </a:t>
-            </a:r>
-            <a:r>
-              <a:rPr/>
-              <a:t>the</a:t>
-            </a:r>
-            <a:r>
-              <a:rPr/>
-              <a:t> </a:t>
-            </a:r>
-            <a:r>
-              <a:rPr/>
-              <a:t>baseline</a:t>
-            </a:r>
-            <a:r>
-              <a:rPr/>
-              <a:t> </a:t>
-            </a:r>
-            <a:r>
-              <a:rPr/>
-              <a:t>values</a:t>
-            </a:r>
-            <a:r>
-              <a:rPr/>
-              <a:t> </a:t>
-            </a:r>
-            <a:r>
-              <a:rPr/>
-              <a:t>look</a:t>
-            </a:r>
-            <a:r>
-              <a:rPr/>
-              <a:t> </a:t>
-            </a:r>
-            <a:r>
-              <a:rPr/>
-              <a:t>like</a:t>
-            </a:r>
-            <a:r>
-              <a:rPr/>
-              <a:t> </a:t>
-            </a:r>
-            <a:r>
-              <a:rPr/>
-              <a:t>for</a:t>
-            </a:r>
-            <a:r>
-              <a:rPr/>
-              <a:t> </a:t>
-            </a:r>
-            <a:r>
-              <a:rPr/>
-              <a:t>the</a:t>
-            </a:r>
-            <a:r>
-              <a:rPr/>
-              <a:t> </a:t>
-            </a:r>
-            <a:r>
-              <a:rPr/>
-              <a:t>drop</a:t>
-            </a:r>
-            <a:r>
-              <a:rPr/>
-              <a:t> </a:t>
-            </a:r>
-            <a:r>
-              <a:rPr/>
-              <a:t>outs</a:t>
-            </a:r>
-            <a:r>
-              <a:rPr/>
-              <a:t> </a:t>
-            </a:r>
-            <a:r>
-              <a:rPr/>
-              <a:t>compared</a:t>
-            </a:r>
-            <a:r>
-              <a:rPr/>
-              <a:t> </a:t>
-            </a:r>
-            <a:r>
-              <a:rPr/>
-              <a:t>to</a:t>
-            </a:r>
-            <a:r>
-              <a:rPr/>
-              <a:t> </a:t>
-            </a:r>
-            <a:r>
-              <a:rPr/>
-              <a:t>those</a:t>
-            </a:r>
-            <a:r>
-              <a:rPr/>
-              <a:t> </a:t>
-            </a:r>
-            <a:r>
-              <a:rPr/>
-              <a:t>who</a:t>
-            </a:r>
-            <a:r>
-              <a:rPr/>
-              <a:t> </a:t>
-            </a:r>
-            <a:r>
-              <a:rPr/>
-              <a:t>stay</a:t>
-            </a:r>
-            <a:r>
-              <a:rPr/>
-              <a:t> </a:t>
-            </a:r>
-            <a:r>
-              <a:rPr/>
-              <a:t>in</a:t>
-            </a:r>
-            <a:r>
-              <a:rPr/>
-              <a:t> </a:t>
-            </a:r>
-            <a:r>
-              <a:rPr/>
-              <a:t>the</a:t>
-            </a:r>
-            <a:r>
-              <a:rPr/>
-              <a:t> </a:t>
-            </a:r>
-            <a:r>
-              <a:rPr/>
-              <a:t>study.</a:t>
-            </a:r>
-            <a:r>
-              <a:rPr/>
-              <a:t> </a:t>
-            </a:r>
-            <a:r>
-              <a:rPr/>
-              <a:t>This</a:t>
-            </a:r>
-            <a:r>
-              <a:rPr/>
-              <a:t> </a:t>
-            </a:r>
-            <a:r>
-              <a:rPr/>
-              <a:t>code</a:t>
-            </a:r>
-            <a:r>
-              <a:rPr/>
-              <a:t> </a:t>
-            </a:r>
-            <a:r>
-              <a:rPr/>
-              <a:t>shows</a:t>
-            </a:r>
-            <a:r>
-              <a:rPr/>
-              <a:t> </a:t>
-            </a:r>
-            <a:r>
-              <a:rPr/>
-              <a:t>how</a:t>
-            </a:r>
-            <a:r>
-              <a:rPr/>
-              <a:t> </a:t>
-            </a:r>
-            <a:r>
-              <a:rPr/>
-              <a:t>to</a:t>
-            </a:r>
-            <a:r>
-              <a:rPr/>
-              <a:t> </a:t>
-            </a:r>
-            <a:r>
-              <a:rPr/>
-              <a:t>get</a:t>
-            </a:r>
-            <a:r>
-              <a:rPr/>
-              <a:t> </a:t>
-            </a:r>
-            <a:r>
-              <a:rPr/>
-              <a:t>an</a:t>
-            </a:r>
-            <a:r>
-              <a:rPr/>
-              <a:t> </a:t>
-            </a:r>
-            <a:r>
-              <a:rPr/>
-              <a:t>overall</a:t>
-            </a:r>
-            <a:r>
-              <a:rPr/>
-              <a:t> </a:t>
-            </a:r>
-            <a:r>
-              <a:rPr/>
-              <a:t>mean</a:t>
-            </a:r>
-            <a:r>
-              <a:rPr/>
-              <a:t> </a:t>
-            </a:r>
-            <a:r>
-              <a:rPr/>
-              <a:t>baseline</a:t>
-            </a:r>
-            <a:r>
-              <a:rPr/>
-              <a:t> </a:t>
-            </a:r>
-            <a:r>
-              <a:rPr/>
-              <a:t>score.</a:t>
+              <a:t>null</a:t>
+            </a:r>
+            <a:r>
+              <a:rPr/>
+              <a:t> </a:t>
+            </a:r>
+            <a:r>
+              <a:rPr/>
+              <a:t>if</a:t>
+            </a:r>
+            <a:r>
+              <a:rPr/>
+              <a:t> </a:t>
+            </a:r>
+            <a:r>
+              <a:rPr/>
+              <a:t>either</a:t>
+            </a:r>
+            <a:r>
+              <a:rPr/>
+              <a:t> </a:t>
+            </a:r>
+            <a:r>
+              <a:rPr/>
+              <a:t>value</a:t>
+            </a:r>
+            <a:r>
+              <a:rPr/>
+              <a:t> </a:t>
+            </a:r>
+            <a:r>
+              <a:rPr/>
+              <a:t>is</a:t>
+            </a:r>
+            <a:r>
+              <a:rPr/>
+              <a:t> </a:t>
+            </a:r>
+            <a:r>
+              <a:rPr/>
+              <a:t>null.</a:t>
             </a:r>
           </a:p>
         </p:txBody>
@@ -3476,7 +2951,87 @@
             </a:pPr>
             <a:r>
               <a:rPr/>
-              <a:t>Here</a:t>
+              <a:t>You</a:t>
+            </a:r>
+            <a:r>
+              <a:rPr/>
+              <a:t> </a:t>
+            </a:r>
+            <a:r>
+              <a:rPr/>
+              <a:t>can</a:t>
+            </a:r>
+            <a:r>
+              <a:rPr/>
+              <a:t> </a:t>
+            </a:r>
+            <a:r>
+              <a:rPr/>
+              <a:t>even</a:t>
+            </a:r>
+            <a:r>
+              <a:rPr/>
+              <a:t> </a:t>
+            </a:r>
+            <a:r>
+              <a:rPr/>
+              <a:t>average</a:t>
+            </a:r>
+            <a:r>
+              <a:rPr/>
+              <a:t> </a:t>
+            </a:r>
+            <a:r>
+              <a:rPr/>
+              <a:t>these</a:t>
+            </a:r>
+            <a:r>
+              <a:rPr/>
+              <a:t> </a:t>
+            </a:r>
+            <a:r>
+              <a:rPr/>
+              <a:t>values.</a:t>
+            </a:r>
+            <a:r>
+              <a:rPr/>
+              <a:t> </a:t>
+            </a:r>
+            <a:r>
+              <a:rPr/>
+              <a:t>Notice</a:t>
+            </a:r>
+            <a:r>
+              <a:rPr/>
+              <a:t> </a:t>
+            </a:r>
+            <a:r>
+              <a:rPr/>
+              <a:t>that</a:t>
+            </a:r>
+            <a:r>
+              <a:rPr/>
+              <a:t> </a:t>
+            </a:r>
+            <a:r>
+              <a:rPr/>
+              <a:t>the</a:t>
+            </a:r>
+            <a:r>
+              <a:rPr/>
+              <a:t> </a:t>
+            </a:r>
+            <a:r>
+              <a:rPr/>
+              <a:t>mean</a:t>
+            </a:r>
+            <a:r>
+              <a:rPr/>
+              <a:t> </a:t>
+            </a:r>
+            <a:r>
+              <a:rPr/>
+              <a:t>change</a:t>
             </a:r>
             <a:r>
               <a:rPr/>
@@ -3492,6 +3047,38 @@
             </a:r>
             <a:r>
               <a:rPr/>
+              <a:t>not</a:t>
+            </a:r>
+            <a:r>
+              <a:rPr/>
+              <a:t> </a:t>
+            </a:r>
+            <a:r>
+              <a:rPr/>
+              <a:t>exactly</a:t>
+            </a:r>
+            <a:r>
+              <a:rPr/>
+              <a:t> </a:t>
+            </a:r>
+            <a:r>
+              <a:rPr/>
+              <a:t>equal</a:t>
+            </a:r>
+            <a:r>
+              <a:rPr/>
+              <a:t> </a:t>
+            </a:r>
+            <a:r>
+              <a:rPr/>
+              <a:t>to</a:t>
+            </a:r>
+            <a:r>
+              <a:rPr/>
+              <a:t> </a:t>
+            </a:r>
+            <a:r>
+              <a:rPr/>
               <a:t>the</a:t>
             </a:r>
             <a:r>
@@ -3500,7 +3087,343 @@
             </a:r>
             <a:r>
               <a:rPr/>
-              <a:t>mean</a:t>
+              <a:t>difference</a:t>
+            </a:r>
+            <a:r>
+              <a:rPr/>
+              <a:t> </a:t>
+            </a:r>
+            <a:r>
+              <a:rPr/>
+              <a:t>in</a:t>
+            </a:r>
+            <a:r>
+              <a:rPr/>
+              <a:t> </a:t>
+            </a:r>
+            <a:r>
+              <a:rPr/>
+              <a:t>the</a:t>
+            </a:r>
+            <a:r>
+              <a:rPr/>
+              <a:t> </a:t>
+            </a:r>
+            <a:r>
+              <a:rPr/>
+              <a:t>two</a:t>
+            </a:r>
+            <a:r>
+              <a:rPr/>
+              <a:t> </a:t>
+            </a:r>
+            <a:r>
+              <a:rPr/>
+              <a:t>means.</a:t>
+            </a:r>
+            <a:r>
+              <a:rPr/>
+              <a:t> </a:t>
+            </a:r>
+            <a:r>
+              <a:rPr/>
+              <a:t>That</a:t>
+            </a:r>
+            <a:r>
+              <a:rPr/>
+              <a:t> </a:t>
+            </a:r>
+            <a:r>
+              <a:rPr/>
+              <a:t>would</a:t>
+            </a:r>
+            <a:r>
+              <a:rPr/>
+              <a:t> </a:t>
+            </a:r>
+            <a:r>
+              <a:rPr/>
+              <a:t>normally</a:t>
+            </a:r>
+            <a:r>
+              <a:rPr/>
+              <a:t> </a:t>
+            </a:r>
+            <a:r>
+              <a:rPr/>
+              <a:t>be</a:t>
+            </a:r>
+            <a:r>
+              <a:rPr/>
+              <a:t> </a:t>
+            </a:r>
+            <a:r>
+              <a:rPr/>
+              <a:t>the</a:t>
+            </a:r>
+            <a:r>
+              <a:rPr/>
+              <a:t> </a:t>
+            </a:r>
+            <a:r>
+              <a:rPr/>
+              <a:t>case,</a:t>
+            </a:r>
+            <a:r>
+              <a:rPr/>
+              <a:t> </a:t>
+            </a:r>
+            <a:r>
+              <a:rPr/>
+              <a:t>but</a:t>
+            </a:r>
+            <a:r>
+              <a:rPr/>
+              <a:t> </a:t>
+            </a:r>
+            <a:r>
+              <a:rPr/>
+              <a:t>remember</a:t>
+            </a:r>
+            <a:r>
+              <a:rPr/>
+              <a:t> </a:t>
+            </a:r>
+            <a:r>
+              <a:rPr/>
+              <a:t>that</a:t>
+            </a:r>
+            <a:r>
+              <a:rPr/>
+              <a:t> </a:t>
+            </a:r>
+            <a:r>
+              <a:rPr/>
+              <a:t>the</a:t>
+            </a:r>
+            <a:r>
+              <a:rPr/>
+              <a:t> </a:t>
+            </a:r>
+            <a:r>
+              <a:rPr/>
+              <a:t>baseline</a:t>
+            </a:r>
+            <a:r>
+              <a:rPr/>
+              <a:t> </a:t>
+            </a:r>
+            <a:r>
+              <a:rPr/>
+              <a:t>average</a:t>
+            </a:r>
+            <a:r>
+              <a:rPr/>
+              <a:t> </a:t>
+            </a:r>
+            <a:r>
+              <a:rPr/>
+              <a:t>is</a:t>
+            </a:r>
+            <a:r>
+              <a:rPr/>
+              <a:t> </a:t>
+            </a:r>
+            <a:r>
+              <a:rPr/>
+              <a:t>an</a:t>
+            </a:r>
+            <a:r>
+              <a:rPr/>
+              <a:t> </a:t>
+            </a:r>
+            <a:r>
+              <a:rPr/>
+              <a:t>average</a:t>
+            </a:r>
+            <a:r>
+              <a:rPr/>
+              <a:t> </a:t>
+            </a:r>
+            <a:r>
+              <a:rPr/>
+              <a:t>that</a:t>
+            </a:r>
+            <a:r>
+              <a:rPr/>
+              <a:t> </a:t>
+            </a:r>
+            <a:r>
+              <a:rPr/>
+              <a:t>includes</a:t>
+            </a:r>
+            <a:r>
+              <a:rPr/>
+              <a:t> </a:t>
+            </a:r>
+            <a:r>
+              <a:rPr/>
+              <a:t>75</a:t>
+            </a:r>
+            <a:r>
+              <a:rPr/>
+              <a:t> </a:t>
+            </a:r>
+            <a:r>
+              <a:rPr/>
+              <a:t>patients</a:t>
+            </a:r>
+            <a:r>
+              <a:rPr/>
+              <a:t> </a:t>
+            </a:r>
+            <a:r>
+              <a:rPr/>
+              <a:t>wihtout</a:t>
+            </a:r>
+            <a:r>
+              <a:rPr/>
+              <a:t> </a:t>
+            </a:r>
+            <a:r>
+              <a:rPr/>
+              <a:t>a</a:t>
+            </a:r>
+            <a:r>
+              <a:rPr/>
+              <a:t> </a:t>
+            </a:r>
+            <a:r>
+              <a:rPr/>
+              <a:t>corresponding</a:t>
+            </a:r>
+            <a:r>
+              <a:rPr/>
+              <a:t> </a:t>
+            </a:r>
+            <a:r>
+              <a:rPr/>
+              <a:t>three</a:t>
+            </a:r>
+            <a:r>
+              <a:rPr/>
+              <a:t> </a:t>
+            </a:r>
+            <a:r>
+              <a:rPr/>
+              <a:t>month</a:t>
+            </a:r>
+            <a:r>
+              <a:rPr/>
+              <a:t> </a:t>
+            </a:r>
+            <a:r>
+              <a:rPr/>
+              <a:t>value.</a:t>
+            </a:r>
+            <a:r>
+              <a:rPr/>
+              <a:t> </a:t>
+            </a:r>
+            <a:r>
+              <a:rPr/>
+              <a:t>You</a:t>
+            </a:r>
+            <a:r>
+              <a:rPr/>
+              <a:t> </a:t>
+            </a:r>
+            <a:r>
+              <a:rPr/>
+              <a:t>could</a:t>
+            </a:r>
+            <a:r>
+              <a:rPr/>
+              <a:t> </a:t>
+            </a:r>
+            <a:r>
+              <a:rPr/>
+              <a:t>restrict</a:t>
+            </a:r>
+            <a:r>
+              <a:rPr/>
+              <a:t> </a:t>
+            </a:r>
+            <a:r>
+              <a:rPr/>
+              <a:t>the</a:t>
+            </a:r>
+            <a:r>
+              <a:rPr/>
+              <a:t> </a:t>
+            </a:r>
+            <a:r>
+              <a:rPr/>
+              <a:t>data</a:t>
+            </a:r>
+            <a:r>
+              <a:rPr/>
+              <a:t> </a:t>
+            </a:r>
+            <a:r>
+              <a:rPr/>
+              <a:t>so</a:t>
+            </a:r>
+            <a:r>
+              <a:rPr/>
+              <a:t> </a:t>
+            </a:r>
+            <a:r>
+              <a:rPr/>
+              <a:t>that</a:t>
+            </a:r>
+            <a:r>
+              <a:rPr/>
+              <a:t> </a:t>
+            </a:r>
+            <a:r>
+              <a:rPr/>
+              <a:t>the</a:t>
+            </a:r>
+            <a:r>
+              <a:rPr/>
+              <a:t> </a:t>
+            </a:r>
+            <a:r>
+              <a:rPr/>
+              <a:t>baseline</a:t>
+            </a:r>
+            <a:r>
+              <a:rPr/>
+              <a:t> </a:t>
+            </a:r>
+            <a:r>
+              <a:rPr/>
+              <a:t>average</a:t>
+            </a:r>
+            <a:r>
+              <a:rPr/>
+              <a:t> </a:t>
+            </a:r>
+            <a:r>
+              <a:rPr/>
+              <a:t>is</a:t>
+            </a:r>
+            <a:r>
+              <a:rPr/>
+              <a:t> </a:t>
+            </a:r>
+            <a:r>
+              <a:rPr/>
+              <a:t>only</a:t>
+            </a:r>
+            <a:r>
+              <a:rPr/>
+              <a:t> </a:t>
+            </a:r>
+            <a:r>
+              <a:rPr/>
+              <a:t>computed</a:t>
             </a:r>
             <a:r>
               <a:rPr/>
@@ -3524,6 +3447,14 @@
             </a:r>
             <a:r>
               <a:rPr/>
+              <a:t>patients</a:t>
+            </a:r>
+            <a:r>
+              <a:rPr/>
+              <a:t> </a:t>
+            </a:r>
+            <a:r>
+              <a:rPr/>
               <a:t>who</a:t>
             </a:r>
             <a:r>
@@ -3532,15 +3463,207 @@
             </a:r>
             <a:r>
               <a:rPr/>
-              <a:t>dropped</a:t>
-            </a:r>
-            <a:r>
-              <a:rPr/>
-              <a:t> </a:t>
-            </a:r>
-            <a:r>
-              <a:rPr/>
-              <a:t>out.</a:t>
+              <a:t>have</a:t>
+            </a:r>
+            <a:r>
+              <a:rPr/>
+              <a:t> </a:t>
+            </a:r>
+            <a:r>
+              <a:rPr/>
+              <a:t>a</a:t>
+            </a:r>
+            <a:r>
+              <a:rPr/>
+              <a:t> </a:t>
+            </a:r>
+            <a:r>
+              <a:rPr/>
+              <a:t>matching</a:t>
+            </a:r>
+            <a:r>
+              <a:rPr/>
+              <a:t> </a:t>
+            </a:r>
+            <a:r>
+              <a:rPr/>
+              <a:t>three</a:t>
+            </a:r>
+            <a:r>
+              <a:rPr/>
+              <a:t> </a:t>
+            </a:r>
+            <a:r>
+              <a:rPr/>
+              <a:t>month</a:t>
+            </a:r>
+            <a:r>
+              <a:rPr/>
+              <a:t> </a:t>
+            </a:r>
+            <a:r>
+              <a:rPr/>
+              <a:t>value.</a:t>
+            </a:r>
+            <a:r>
+              <a:rPr/>
+              <a:t> </a:t>
+            </a:r>
+            <a:r>
+              <a:rPr/>
+              <a:t>You</a:t>
+            </a:r>
+            <a:r>
+              <a:rPr/>
+              <a:t> </a:t>
+            </a:r>
+            <a:r>
+              <a:rPr/>
+              <a:t>could</a:t>
+            </a:r>
+            <a:r>
+              <a:rPr/>
+              <a:t> </a:t>
+            </a:r>
+            <a:r>
+              <a:rPr/>
+              <a:t>do</a:t>
+            </a:r>
+            <a:r>
+              <a:rPr/>
+              <a:t> </a:t>
+            </a:r>
+            <a:r>
+              <a:rPr/>
+              <a:t>this</a:t>
+            </a:r>
+            <a:r>
+              <a:rPr/>
+              <a:t> </a:t>
+            </a:r>
+            <a:r>
+              <a:rPr/>
+              <a:t>using</a:t>
+            </a:r>
+            <a:r>
+              <a:rPr/>
+              <a:t> </a:t>
+            </a:r>
+            <a:r>
+              <a:rPr/>
+              <a:t>an</a:t>
+            </a:r>
+            <a:r>
+              <a:rPr/>
+              <a:t> </a:t>
+            </a:r>
+            <a:r>
+              <a:rPr/>
+              <a:t>inner</a:t>
+            </a:r>
+            <a:r>
+              <a:rPr/>
+              <a:t> </a:t>
+            </a:r>
+            <a:r>
+              <a:rPr/>
+              <a:t>join</a:t>
+            </a:r>
+            <a:r>
+              <a:rPr/>
+              <a:t> </a:t>
+            </a:r>
+            <a:r>
+              <a:rPr/>
+              <a:t>or</a:t>
+            </a:r>
+            <a:r>
+              <a:rPr/>
+              <a:t> </a:t>
+            </a:r>
+            <a:r>
+              <a:rPr/>
+              <a:t>by</a:t>
+            </a:r>
+            <a:r>
+              <a:rPr/>
+              <a:t> </a:t>
+            </a:r>
+            <a:r>
+              <a:rPr/>
+              <a:t>restricting</a:t>
+            </a:r>
+            <a:r>
+              <a:rPr/>
+              <a:t> </a:t>
+            </a:r>
+            <a:r>
+              <a:rPr/>
+              <a:t>the</a:t>
+            </a:r>
+            <a:r>
+              <a:rPr/>
+              <a:t> </a:t>
+            </a:r>
+            <a:r>
+              <a:rPr/>
+              <a:t>data</a:t>
+            </a:r>
+            <a:r>
+              <a:rPr/>
+              <a:t> </a:t>
+            </a:r>
+            <a:r>
+              <a:rPr/>
+              <a:t>to</a:t>
+            </a:r>
+            <a:r>
+              <a:rPr/>
+              <a:t> </a:t>
+            </a:r>
+            <a:r>
+              <a:rPr/>
+              <a:t>cases</a:t>
+            </a:r>
+            <a:r>
+              <a:rPr/>
+              <a:t> </a:t>
+            </a:r>
+            <a:r>
+              <a:rPr/>
+              <a:t>where</a:t>
+            </a:r>
+            <a:r>
+              <a:rPr/>
+              <a:t> </a:t>
+            </a:r>
+            <a:r>
+              <a:rPr/>
+              <a:t>pk2</a:t>
+            </a:r>
+            <a:r>
+              <a:rPr/>
+              <a:t> </a:t>
+            </a:r>
+            <a:r>
+              <a:rPr/>
+              <a:t>is</a:t>
+            </a:r>
+            <a:r>
+              <a:rPr/>
+              <a:t> </a:t>
+            </a:r>
+            <a:r>
+              <a:rPr/>
+              <a:t>not</a:t>
+            </a:r>
+            <a:r>
+              <a:rPr/>
+              <a:t> </a:t>
+            </a:r>
+            <a:r>
+              <a:rPr/>
+              <a:t>null.</a:t>
             </a:r>
           </a:p>
         </p:txBody>
@@ -3622,7 +3745,23 @@
             </a:pPr>
             <a:r>
               <a:rPr/>
-              <a:t>Here</a:t>
+              <a:t>An</a:t>
+            </a:r>
+            <a:r>
+              <a:rPr/>
+              <a:t> </a:t>
+            </a:r>
+            <a:r>
+              <a:rPr/>
+              <a:t>important</a:t>
+            </a:r>
+            <a:r>
+              <a:rPr/>
+              <a:t> </a:t>
+            </a:r>
+            <a:r>
+              <a:rPr/>
+              <a:t>comparison</a:t>
             </a:r>
             <a:r>
               <a:rPr/>
@@ -3638,6 +3777,14 @@
             </a:r>
             <a:r>
               <a:rPr/>
+              <a:t>what</a:t>
+            </a:r>
+            <a:r>
+              <a:rPr/>
+              <a:t> </a:t>
+            </a:r>
+            <a:r>
+              <a:rPr/>
               <a:t>the</a:t>
             </a:r>
             <a:r>
@@ -3646,6 +3793,198 @@
             </a:r>
             <a:r>
               <a:rPr/>
+              <a:t>baseline</a:t>
+            </a:r>
+            <a:r>
+              <a:rPr/>
+              <a:t> </a:t>
+            </a:r>
+            <a:r>
+              <a:rPr/>
+              <a:t>values</a:t>
+            </a:r>
+            <a:r>
+              <a:rPr/>
+              <a:t> </a:t>
+            </a:r>
+            <a:r>
+              <a:rPr/>
+              <a:t>look</a:t>
+            </a:r>
+            <a:r>
+              <a:rPr/>
+              <a:t> </a:t>
+            </a:r>
+            <a:r>
+              <a:rPr/>
+              <a:t>like</a:t>
+            </a:r>
+            <a:r>
+              <a:rPr/>
+              <a:t> </a:t>
+            </a:r>
+            <a:r>
+              <a:rPr/>
+              <a:t>for</a:t>
+            </a:r>
+            <a:r>
+              <a:rPr/>
+              <a:t> </a:t>
+            </a:r>
+            <a:r>
+              <a:rPr/>
+              <a:t>the</a:t>
+            </a:r>
+            <a:r>
+              <a:rPr/>
+              <a:t> </a:t>
+            </a:r>
+            <a:r>
+              <a:rPr/>
+              <a:t>drop</a:t>
+            </a:r>
+            <a:r>
+              <a:rPr/>
+              <a:t> </a:t>
+            </a:r>
+            <a:r>
+              <a:rPr/>
+              <a:t>outs</a:t>
+            </a:r>
+            <a:r>
+              <a:rPr/>
+              <a:t> </a:t>
+            </a:r>
+            <a:r>
+              <a:rPr/>
+              <a:t>compared</a:t>
+            </a:r>
+            <a:r>
+              <a:rPr/>
+              <a:t> </a:t>
+            </a:r>
+            <a:r>
+              <a:rPr/>
+              <a:t>to</a:t>
+            </a:r>
+            <a:r>
+              <a:rPr/>
+              <a:t> </a:t>
+            </a:r>
+            <a:r>
+              <a:rPr/>
+              <a:t>those</a:t>
+            </a:r>
+            <a:r>
+              <a:rPr/>
+              <a:t> </a:t>
+            </a:r>
+            <a:r>
+              <a:rPr/>
+              <a:t>who</a:t>
+            </a:r>
+            <a:r>
+              <a:rPr/>
+              <a:t> </a:t>
+            </a:r>
+            <a:r>
+              <a:rPr/>
+              <a:t>stay</a:t>
+            </a:r>
+            <a:r>
+              <a:rPr/>
+              <a:t> </a:t>
+            </a:r>
+            <a:r>
+              <a:rPr/>
+              <a:t>in</a:t>
+            </a:r>
+            <a:r>
+              <a:rPr/>
+              <a:t> </a:t>
+            </a:r>
+            <a:r>
+              <a:rPr/>
+              <a:t>the</a:t>
+            </a:r>
+            <a:r>
+              <a:rPr/>
+              <a:t> </a:t>
+            </a:r>
+            <a:r>
+              <a:rPr/>
+              <a:t>study.</a:t>
+            </a:r>
+            <a:r>
+              <a:rPr/>
+              <a:t> </a:t>
+            </a:r>
+            <a:r>
+              <a:rPr/>
+              <a:t>This</a:t>
+            </a:r>
+            <a:r>
+              <a:rPr/>
+              <a:t> </a:t>
+            </a:r>
+            <a:r>
+              <a:rPr/>
+              <a:t>code</a:t>
+            </a:r>
+            <a:r>
+              <a:rPr/>
+              <a:t> </a:t>
+            </a:r>
+            <a:r>
+              <a:rPr/>
+              <a:t>shows</a:t>
+            </a:r>
+            <a:r>
+              <a:rPr/>
+              <a:t> </a:t>
+            </a:r>
+            <a:r>
+              <a:rPr/>
+              <a:t>how</a:t>
+            </a:r>
+            <a:r>
+              <a:rPr/>
+              <a:t> </a:t>
+            </a:r>
+            <a:r>
+              <a:rPr/>
+              <a:t>to</a:t>
+            </a:r>
+            <a:r>
+              <a:rPr/>
+              <a:t> </a:t>
+            </a:r>
+            <a:r>
+              <a:rPr/>
+              <a:t>get</a:t>
+            </a:r>
+            <a:r>
+              <a:rPr/>
+              <a:t> </a:t>
+            </a:r>
+            <a:r>
+              <a:rPr/>
+              <a:t>an</a:t>
+            </a:r>
+            <a:r>
+              <a:rPr/>
+              <a:t> </a:t>
+            </a:r>
+            <a:r>
+              <a:rPr/>
+              <a:t>overall</a:t>
+            </a:r>
+            <a:r>
+              <a:rPr/>
+              <a:t> </a:t>
+            </a:r>
+            <a:r>
+              <a:rPr/>
               <a:t>mean</a:t>
             </a:r>
             <a:r>
@@ -3654,55 +3993,15 @@
             </a:r>
             <a:r>
               <a:rPr/>
-              <a:t>for</a:t>
-            </a:r>
-            <a:r>
-              <a:rPr/>
-              <a:t> </a:t>
-            </a:r>
-            <a:r>
-              <a:rPr/>
-              <a:t>those</a:t>
-            </a:r>
-            <a:r>
-              <a:rPr/>
-              <a:t> </a:t>
-            </a:r>
-            <a:r>
-              <a:rPr/>
-              <a:t>who</a:t>
-            </a:r>
-            <a:r>
-              <a:rPr/>
-              <a:t> </a:t>
-            </a:r>
-            <a:r>
-              <a:rPr/>
-              <a:t>did</a:t>
-            </a:r>
-            <a:r>
-              <a:rPr/>
-              <a:t> </a:t>
-            </a:r>
-            <a:r>
-              <a:rPr/>
-              <a:t>not</a:t>
-            </a:r>
-            <a:r>
-              <a:rPr/>
-              <a:t> </a:t>
-            </a:r>
-            <a:r>
-              <a:rPr/>
-              <a:t>drop</a:t>
-            </a:r>
-            <a:r>
-              <a:rPr/>
-              <a:t> </a:t>
-            </a:r>
-            <a:r>
-              <a:rPr/>
-              <a:t>out.</a:t>
+              <a:t>baseline</a:t>
+            </a:r>
+            <a:r>
+              <a:rPr/>
+              <a:t> </a:t>
+            </a:r>
+            <a:r>
+              <a:rPr/>
+              <a:t>score.</a:t>
             </a:r>
           </a:p>
         </p:txBody>
@@ -3725,6 +4024,314 @@
             <a:fld id="{18BDFEC3-8487-43E8-A154-7C12CBC1FFF2}" type="slidenum">
               <a:rPr lang="en-US"/>
               <a:t>16</a:t>
+            </a:fld>
+            <a:endParaRPr lang="en-US"/>
+          </a:p>
+        </p:txBody>
+      </p:sp>
+    </p:spTree>
+  </p:cSld>
+</p:notes>
+</file>
+
+<file path=ppt/notesSlides/notesSlide16.xml><?xml version="1.0" encoding="utf-8"?>
+<p:notes xmlns:a="http://schemas.openxmlformats.org/drawingml/2006/main" xmlns:r="http://schemas.openxmlformats.org/officeDocument/2006/relationships" xmlns:p="http://schemas.openxmlformats.org/presentationml/2006/main">
+  <p:cSld>
+    <p:spTree>
+      <p:nvGrpSpPr>
+        <p:cNvPr id="1" name=""/>
+        <p:cNvGrpSpPr/>
+        <p:nvPr/>
+      </p:nvGrpSpPr>
+      <p:grpSpPr>
+        <a:xfrm>
+          <a:off x="0" y="0"/>
+          <a:ext cx="0" cy="0"/>
+          <a:chOff x="0" y="0"/>
+          <a:chExt cx="0" cy="0"/>
+        </a:xfrm>
+      </p:grpSpPr>
+      <p:sp>
+        <p:nvSpPr>
+          <p:cNvPr id="2" name="Slide Image Placeholder 1"/>
+          <p:cNvSpPr>
+            <a:spLocks noGrp="1" noRot="1" noChangeAspect="1"/>
+          </p:cNvSpPr>
+          <p:nvPr>
+            <p:ph type="sldImg"/>
+          </p:nvPr>
+        </p:nvSpPr>
+        <p:spPr/>
+      </p:sp>
+      <p:sp>
+        <p:nvSpPr>
+          <p:cNvPr id="3" name="Notes Placeholder 2"/>
+          <p:cNvSpPr>
+            <a:spLocks noGrp="1"/>
+          </p:cNvSpPr>
+          <p:nvPr>
+            <p:ph type="body" idx="1"/>
+          </p:nvPr>
+        </p:nvSpPr>
+        <p:spPr/>
+        <p:txBody>
+          <a:bodyPr/>
+          <a:lstStyle/>
+          <a:p>
+            <a:pPr lvl="0" marL="0" indent="0">
+              <a:buNone/>
+            </a:pPr>
+            <a:r>
+              <a:rPr/>
+              <a:t>Here</a:t>
+            </a:r>
+            <a:r>
+              <a:rPr/>
+              <a:t> </a:t>
+            </a:r>
+            <a:r>
+              <a:rPr/>
+              <a:t>is</a:t>
+            </a:r>
+            <a:r>
+              <a:rPr/>
+              <a:t> </a:t>
+            </a:r>
+            <a:r>
+              <a:rPr/>
+              <a:t>the</a:t>
+            </a:r>
+            <a:r>
+              <a:rPr/>
+              <a:t> </a:t>
+            </a:r>
+            <a:r>
+              <a:rPr/>
+              <a:t>mean</a:t>
+            </a:r>
+            <a:r>
+              <a:rPr/>
+              <a:t> </a:t>
+            </a:r>
+            <a:r>
+              <a:rPr/>
+              <a:t>for</a:t>
+            </a:r>
+            <a:r>
+              <a:rPr/>
+              <a:t> </a:t>
+            </a:r>
+            <a:r>
+              <a:rPr/>
+              <a:t>those</a:t>
+            </a:r>
+            <a:r>
+              <a:rPr/>
+              <a:t> </a:t>
+            </a:r>
+            <a:r>
+              <a:rPr/>
+              <a:t>who</a:t>
+            </a:r>
+            <a:r>
+              <a:rPr/>
+              <a:t> </a:t>
+            </a:r>
+            <a:r>
+              <a:rPr/>
+              <a:t>dropped</a:t>
+            </a:r>
+            <a:r>
+              <a:rPr/>
+              <a:t> </a:t>
+            </a:r>
+            <a:r>
+              <a:rPr/>
+              <a:t>out.</a:t>
+            </a:r>
+          </a:p>
+        </p:txBody>
+      </p:sp>
+      <p:sp>
+        <p:nvSpPr>
+          <p:cNvPr id="4" name="Slide Number Placeholder 3"/>
+          <p:cNvSpPr>
+            <a:spLocks noGrp="1"/>
+          </p:cNvSpPr>
+          <p:nvPr>
+            <p:ph type="sldNum" sz="quarter" idx="10"/>
+          </p:nvPr>
+        </p:nvSpPr>
+        <p:spPr/>
+        <p:txBody>
+          <a:bodyPr/>
+          <a:lstStyle/>
+          <a:p>
+            <a:fld id="{18BDFEC3-8487-43E8-A154-7C12CBC1FFF2}" type="slidenum">
+              <a:rPr lang="en-US"/>
+              <a:t>17</a:t>
+            </a:fld>
+            <a:endParaRPr lang="en-US"/>
+          </a:p>
+        </p:txBody>
+      </p:sp>
+    </p:spTree>
+  </p:cSld>
+</p:notes>
+</file>
+
+<file path=ppt/notesSlides/notesSlide17.xml><?xml version="1.0" encoding="utf-8"?>
+<p:notes xmlns:a="http://schemas.openxmlformats.org/drawingml/2006/main" xmlns:r="http://schemas.openxmlformats.org/officeDocument/2006/relationships" xmlns:p="http://schemas.openxmlformats.org/presentationml/2006/main">
+  <p:cSld>
+    <p:spTree>
+      <p:nvGrpSpPr>
+        <p:cNvPr id="1" name=""/>
+        <p:cNvGrpSpPr/>
+        <p:nvPr/>
+      </p:nvGrpSpPr>
+      <p:grpSpPr>
+        <a:xfrm>
+          <a:off x="0" y="0"/>
+          <a:ext cx="0" cy="0"/>
+          <a:chOff x="0" y="0"/>
+          <a:chExt cx="0" cy="0"/>
+        </a:xfrm>
+      </p:grpSpPr>
+      <p:sp>
+        <p:nvSpPr>
+          <p:cNvPr id="2" name="Slide Image Placeholder 1"/>
+          <p:cNvSpPr>
+            <a:spLocks noGrp="1" noRot="1" noChangeAspect="1"/>
+          </p:cNvSpPr>
+          <p:nvPr>
+            <p:ph type="sldImg"/>
+          </p:nvPr>
+        </p:nvSpPr>
+        <p:spPr/>
+      </p:sp>
+      <p:sp>
+        <p:nvSpPr>
+          <p:cNvPr id="3" name="Notes Placeholder 2"/>
+          <p:cNvSpPr>
+            <a:spLocks noGrp="1"/>
+          </p:cNvSpPr>
+          <p:nvPr>
+            <p:ph type="body" idx="1"/>
+          </p:nvPr>
+        </p:nvSpPr>
+        <p:spPr/>
+        <p:txBody>
+          <a:bodyPr/>
+          <a:lstStyle/>
+          <a:p>
+            <a:pPr lvl="0" marL="0" indent="0">
+              <a:buNone/>
+            </a:pPr>
+            <a:r>
+              <a:rPr/>
+              <a:t>Here</a:t>
+            </a:r>
+            <a:r>
+              <a:rPr/>
+              <a:t> </a:t>
+            </a:r>
+            <a:r>
+              <a:rPr/>
+              <a:t>is</a:t>
+            </a:r>
+            <a:r>
+              <a:rPr/>
+              <a:t> </a:t>
+            </a:r>
+            <a:r>
+              <a:rPr/>
+              <a:t>the</a:t>
+            </a:r>
+            <a:r>
+              <a:rPr/>
+              <a:t> </a:t>
+            </a:r>
+            <a:r>
+              <a:rPr/>
+              <a:t>mean</a:t>
+            </a:r>
+            <a:r>
+              <a:rPr/>
+              <a:t> </a:t>
+            </a:r>
+            <a:r>
+              <a:rPr/>
+              <a:t>for</a:t>
+            </a:r>
+            <a:r>
+              <a:rPr/>
+              <a:t> </a:t>
+            </a:r>
+            <a:r>
+              <a:rPr/>
+              <a:t>those</a:t>
+            </a:r>
+            <a:r>
+              <a:rPr/>
+              <a:t> </a:t>
+            </a:r>
+            <a:r>
+              <a:rPr/>
+              <a:t>who</a:t>
+            </a:r>
+            <a:r>
+              <a:rPr/>
+              <a:t> </a:t>
+            </a:r>
+            <a:r>
+              <a:rPr/>
+              <a:t>did</a:t>
+            </a:r>
+            <a:r>
+              <a:rPr/>
+              <a:t> </a:t>
+            </a:r>
+            <a:r>
+              <a:rPr/>
+              <a:t>not</a:t>
+            </a:r>
+            <a:r>
+              <a:rPr/>
+              <a:t> </a:t>
+            </a:r>
+            <a:r>
+              <a:rPr/>
+              <a:t>drop</a:t>
+            </a:r>
+            <a:r>
+              <a:rPr/>
+              <a:t> </a:t>
+            </a:r>
+            <a:r>
+              <a:rPr/>
+              <a:t>out.</a:t>
+            </a:r>
+          </a:p>
+        </p:txBody>
+      </p:sp>
+      <p:sp>
+        <p:nvSpPr>
+          <p:cNvPr id="4" name="Slide Number Placeholder 3"/>
+          <p:cNvSpPr>
+            <a:spLocks noGrp="1"/>
+          </p:cNvSpPr>
+          <p:nvPr>
+            <p:ph type="sldNum" sz="quarter" idx="10"/>
+          </p:nvPr>
+        </p:nvSpPr>
+        <p:spPr/>
+        <p:txBody>
+          <a:bodyPr/>
+          <a:lstStyle/>
+          <a:p>
+            <a:fld id="{18BDFEC3-8487-43E8-A154-7C12CBC1FFF2}" type="slidenum">
+              <a:rPr lang="en-US"/>
+              <a:t>18</a:t>
             </a:fld>
             <a:endParaRPr lang="en-US"/>
           </a:p>
@@ -8978,23 +9585,23 @@
             </a:pPr>
             <a:r>
               <a:rPr/>
-              <a:t>Compute</a:t>
-            </a:r>
-            <a:r>
-              <a:rPr/>
-              <a:t> </a:t>
-            </a:r>
-            <a:r>
-              <a:rPr/>
-              <a:t>change</a:t>
-            </a:r>
-            <a:r>
-              <a:rPr/>
-              <a:t> </a:t>
-            </a:r>
-            <a:r>
-              <a:rPr/>
-              <a:t>score</a:t>
+              <a:t>Listing</a:t>
+            </a:r>
+            <a:r>
+              <a:rPr/>
+              <a:t> </a:t>
+            </a:r>
+            <a:r>
+              <a:rPr/>
+              <a:t>unmatched</a:t>
+            </a:r>
+            <a:r>
+              <a:rPr/>
+              <a:t> </a:t>
+            </a:r>
+            <a:r>
+              <a:rPr/>
+              <a:t>labels</a:t>
             </a:r>
           </a:p>
         </p:txBody>
@@ -9028,11 +9635,11 @@
               <a:rPr sz="1800">
                 <a:latin typeface="Courier"/>
               </a:rPr>
-              <a:t>select pk1, pk2, pk2-pk1 as change_score
-  from baseline_table as bas
-  left join three_month_table as mo3
-  on bas.id=mo3.id
-  limit 5</a:t>
+              <a:t>select sex_label as umatched_label
+  from sex_table
+  left join demog_table
+  on sex=sex_code
+  where sex is null</a:t>
             </a:r>
           </a:p>
           <a:p>
@@ -9050,12 +9657,8 @@
               <a:rPr sz="1800">
                 <a:latin typeface="Courier"/>
               </a:rPr>
-              <a:t>##     pk1  pk2 change_score
-## 1 10.75   NA           NA
-## 2  9.50   NA           NA
-## 3 16.00   NA           NA
-## 4 32.50 44.0         11.5
-## 5 16.50 17.5          1.0</a:t>
+              <a:t>##   umatched_label
+## 1        Unknown</a:t>
             </a:r>
           </a:p>
         </p:txBody>
@@ -9102,31 +9705,23 @@
             </a:pPr>
             <a:r>
               <a:rPr/>
-              <a:t>Compute</a:t>
-            </a:r>
-            <a:r>
-              <a:rPr/>
-              <a:t> </a:t>
-            </a:r>
-            <a:r>
-              <a:rPr/>
-              <a:t>average</a:t>
-            </a:r>
-            <a:r>
-              <a:rPr/>
-              <a:t> </a:t>
-            </a:r>
-            <a:r>
-              <a:rPr/>
-              <a:t>change</a:t>
-            </a:r>
-            <a:r>
-              <a:rPr/>
-              <a:t> </a:t>
-            </a:r>
-            <a:r>
-              <a:rPr/>
-              <a:t>score</a:t>
+              <a:t>Listing</a:t>
+            </a:r>
+            <a:r>
+              <a:rPr/>
+              <a:t> </a:t>
+            </a:r>
+            <a:r>
+              <a:rPr/>
+              <a:t>unmatched</a:t>
+            </a:r>
+            <a:r>
+              <a:rPr/>
+              <a:t> </a:t>
+            </a:r>
+            <a:r>
+              <a:rPr/>
+              <a:t>codes</a:t>
             </a:r>
           </a:p>
         </p:txBody>
@@ -9160,13 +9755,11 @@
               <a:rPr sz="1800">
                 <a:latin typeface="Courier"/>
               </a:rPr>
-              <a:t>select 
-  round(avg(pk1), 1) as bas_mean, 
-  round(avg(pk2), 1) as mo3_mean, 
-  round(avg(pk2-pk1), 1) as mean_change
-  from baseline_table as bas
-  left join three_month_table as mo3
-  on bas.id=mo3.id</a:t>
+              <a:t>select sex as umatched_code
+  from demog_table
+  left join sex_table
+  on sex=sex_code
+  where sex_code is null</a:t>
             </a:r>
           </a:p>
           <a:p>
@@ -9184,8 +9777,8 @@
               <a:rPr sz="1800">
                 <a:latin typeface="Courier"/>
               </a:rPr>
-              <a:t>##   bas_mean mo3_mean mean_change
-## 1     26.5     21.6        -4.7</a:t>
+              <a:t>## [1] umatched_code
+## &lt;0 rows&gt; (or 0-length row.names)</a:t>
             </a:r>
           </a:p>
         </p:txBody>
@@ -9232,31 +9825,23 @@
             </a:pPr>
             <a:r>
               <a:rPr/>
-              <a:t>Compare</a:t>
-            </a:r>
-            <a:r>
-              <a:rPr/>
-              <a:t> </a:t>
-            </a:r>
-            <a:r>
-              <a:rPr/>
-              <a:t>drop</a:t>
-            </a:r>
-            <a:r>
-              <a:rPr/>
-              <a:t> </a:t>
-            </a:r>
-            <a:r>
-              <a:rPr/>
-              <a:t>outs</a:t>
-            </a:r>
-            <a:r>
-              <a:rPr/>
-              <a:t> </a:t>
-            </a:r>
-            <a:r>
-              <a:rPr/>
-              <a:t>(1/3)</a:t>
+              <a:t>Compute</a:t>
+            </a:r>
+            <a:r>
+              <a:rPr/>
+              <a:t> </a:t>
+            </a:r>
+            <a:r>
+              <a:rPr/>
+              <a:t>change</a:t>
+            </a:r>
+            <a:r>
+              <a:rPr/>
+              <a:t> </a:t>
+            </a:r>
+            <a:r>
+              <a:rPr/>
+              <a:t>score</a:t>
             </a:r>
           </a:p>
         </p:txBody>
@@ -9290,10 +9875,11 @@
               <a:rPr sz="1800">
                 <a:latin typeface="Courier"/>
               </a:rPr>
-              <a:t>select avg(pk1) as mean_baseline, count(*) as n
+              <a:t>select pk1, pk2, pk2-pk1 as change_score
   from baseline_table as bas
   left join three_month_table as mo3
-  on bas.id=mo3.id</a:t>
+  on bas.id=mo3.id
+  limit 5</a:t>
             </a:r>
           </a:p>
           <a:p>
@@ -9311,8 +9897,12 @@
               <a:rPr sz="1800">
                 <a:latin typeface="Courier"/>
               </a:rPr>
-              <a:t>##   mean_baseline   n
-## 1      26.50998 401</a:t>
+              <a:t>##     pk1  pk2 change_score
+## 1 10.75   NA           NA
+## 2  9.50   NA           NA
+## 3 16.00   NA           NA
+## 4 32.50 44.0         11.5
+## 5 16.50 17.5          1.0</a:t>
             </a:r>
           </a:p>
         </p:txBody>
@@ -9359,31 +9949,31 @@
             </a:pPr>
             <a:r>
               <a:rPr/>
-              <a:t>Compare</a:t>
-            </a:r>
-            <a:r>
-              <a:rPr/>
-              <a:t> </a:t>
-            </a:r>
-            <a:r>
-              <a:rPr/>
-              <a:t>drop</a:t>
-            </a:r>
-            <a:r>
-              <a:rPr/>
-              <a:t> </a:t>
-            </a:r>
-            <a:r>
-              <a:rPr/>
-              <a:t>outs</a:t>
-            </a:r>
-            <a:r>
-              <a:rPr/>
-              <a:t> </a:t>
-            </a:r>
-            <a:r>
-              <a:rPr/>
-              <a:t>(2/3)</a:t>
+              <a:t>Compute</a:t>
+            </a:r>
+            <a:r>
+              <a:rPr/>
+              <a:t> </a:t>
+            </a:r>
+            <a:r>
+              <a:rPr/>
+              <a:t>average</a:t>
+            </a:r>
+            <a:r>
+              <a:rPr/>
+              <a:t> </a:t>
+            </a:r>
+            <a:r>
+              <a:rPr/>
+              <a:t>change</a:t>
+            </a:r>
+            <a:r>
+              <a:rPr/>
+              <a:t> </a:t>
+            </a:r>
+            <a:r>
+              <a:rPr/>
+              <a:t>score</a:t>
             </a:r>
           </a:p>
         </p:txBody>
@@ -9417,11 +10007,13 @@
               <a:rPr sz="1800">
                 <a:latin typeface="Courier"/>
               </a:rPr>
-              <a:t>select avg(pk1) as mean_baseline, count(*) as n
+              <a:t>select 
+  round(avg(pk1), 1) as bas_mean, 
+  round(avg(pk2), 1) as mo3_mean, 
+  round(avg(pk2-pk1), 1) as mean_change
   from baseline_table as bas
   left join three_month_table as mo3
-  on bas.id=mo3.id
-  where mo3.id is null</a:t>
+  on bas.id=mo3.id</a:t>
             </a:r>
           </a:p>
           <a:p>
@@ -9439,8 +10031,8 @@
               <a:rPr sz="1800">
                 <a:latin typeface="Courier"/>
               </a:rPr>
-              <a:t>##   mean_baseline  n
-## 1      27.36667 75</a:t>
+              <a:t>##   bas_mean mo3_mean mean_change
+## 1     26.5     21.6        -4.7</a:t>
             </a:r>
           </a:p>
         </p:txBody>
@@ -9511,7 +10103,7 @@
             </a:r>
             <a:r>
               <a:rPr/>
-              <a:t>(3/3)</a:t>
+              <a:t>(1/3)</a:t>
             </a:r>
           </a:p>
         </p:txBody>
@@ -9548,8 +10140,7 @@
               <a:t>select avg(pk1) as mean_baseline, count(*) as n
   from baseline_table as bas
   left join three_month_table as mo3
-  on bas.id=mo3.id
-  where mo3.id is not null</a:t>
+  on bas.id=mo3.id</a:t>
             </a:r>
           </a:p>
           <a:p>
@@ -9568,7 +10159,7 @@
                 <a:latin typeface="Courier"/>
               </a:rPr>
               <a:t>##   mean_baseline   n
-## 1      26.31288 326</a:t>
+## 1      26.50998 401</a:t>
             </a:r>
           </a:p>
         </p:txBody>
@@ -9615,7 +10206,88 @@
             </a:pPr>
             <a:r>
               <a:rPr/>
-              <a:t>Summary</a:t>
+              <a:t>Compare</a:t>
+            </a:r>
+            <a:r>
+              <a:rPr/>
+              <a:t> </a:t>
+            </a:r>
+            <a:r>
+              <a:rPr/>
+              <a:t>drop</a:t>
+            </a:r>
+            <a:r>
+              <a:rPr/>
+              <a:t> </a:t>
+            </a:r>
+            <a:r>
+              <a:rPr/>
+              <a:t>outs</a:t>
+            </a:r>
+            <a:r>
+              <a:rPr/>
+              <a:t> </a:t>
+            </a:r>
+            <a:r>
+              <a:rPr/>
+              <a:t>(2/3)</a:t>
+            </a:r>
+          </a:p>
+        </p:txBody>
+      </p:sp>
+      <p:sp>
+        <p:nvSpPr>
+          <p:cNvPr id="3" name="Content Placeholder 2"/>
+          <p:cNvSpPr>
+            <a:spLocks noGrp="1"/>
+          </p:cNvSpPr>
+          <p:nvPr>
+            <p:ph idx="1"/>
+          </p:nvPr>
+        </p:nvSpPr>
+        <p:spPr/>
+        <p:txBody>
+          <a:bodyPr/>
+          <a:lstStyle/>
+          <a:p>
+            <a:pPr lvl="1"/>
+            <a:r>
+              <a:rPr/>
+              <a:t>SQL code</a:t>
+            </a:r>
+          </a:p>
+          <a:p>
+            <a:pPr lvl="0" marL="1270000" indent="0">
+              <a:buNone/>
+            </a:pPr>
+            <a:r>
+              <a:rPr sz="1800">
+                <a:latin typeface="Courier"/>
+              </a:rPr>
+              <a:t>select avg(pk1) as mean_baseline, count(*) as n
+  from baseline_table as bas
+  left join three_month_table as mo3
+  on bas.id=mo3.id
+  where mo3.id is null</a:t>
+            </a:r>
+          </a:p>
+          <a:p>
+            <a:pPr lvl="1"/>
+            <a:r>
+              <a:rPr/>
+              <a:t>SQL output</a:t>
+            </a:r>
+          </a:p>
+          <a:p>
+            <a:pPr lvl="0" marL="1270000" indent="0">
+              <a:buNone/>
+            </a:pPr>
+            <a:r>
+              <a:rPr sz="1800">
+                <a:latin typeface="Courier"/>
+              </a:rPr>
+              <a:t>##   mean_baseline  n
+## 1      27.36667 75</a:t>
             </a:r>
           </a:p>
         </p:txBody>
@@ -9662,7 +10334,31 @@
             </a:pPr>
             <a:r>
               <a:rPr/>
-              <a:t>Homework</a:t>
+              <a:t>Compare</a:t>
+            </a:r>
+            <a:r>
+              <a:rPr/>
+              <a:t> </a:t>
+            </a:r>
+            <a:r>
+              <a:rPr/>
+              <a:t>drop</a:t>
+            </a:r>
+            <a:r>
+              <a:rPr/>
+              <a:t> </a:t>
+            </a:r>
+            <a:r>
+              <a:rPr/>
+              <a:t>outs</a:t>
+            </a:r>
+            <a:r>
+              <a:rPr/>
+              <a:t> </a:t>
+            </a:r>
+            <a:r>
+              <a:rPr/>
+              <a:t>(3/3)</a:t>
             </a:r>
           </a:p>
         </p:txBody>
@@ -9685,7 +10381,146 @@
             <a:pPr lvl="1"/>
             <a:r>
               <a:rPr/>
-              <a:t>Use the same database used in this video. It is available as longitudinal_example_db.sqlite on the Canvas website or you can find it on the Insights platform.</a:t>
+              <a:t>SQL code</a:t>
+            </a:r>
+          </a:p>
+          <a:p>
+            <a:pPr lvl="0" marL="1270000" indent="0">
+              <a:buNone/>
+            </a:pPr>
+            <a:r>
+              <a:rPr sz="1800">
+                <a:latin typeface="Courier"/>
+              </a:rPr>
+              <a:t>select avg(pk1) as mean_baseline, count(*) as n
+  from baseline_table as bas
+  left join three_month_table as mo3
+  on bas.id=mo3.id
+  where mo3.id is not null</a:t>
+            </a:r>
+          </a:p>
+          <a:p>
+            <a:pPr lvl="1"/>
+            <a:r>
+              <a:rPr/>
+              <a:t>SQL output</a:t>
+            </a:r>
+          </a:p>
+          <a:p>
+            <a:pPr lvl="0" marL="1270000" indent="0">
+              <a:buNone/>
+            </a:pPr>
+            <a:r>
+              <a:rPr sz="1800">
+                <a:latin typeface="Courier"/>
+              </a:rPr>
+              <a:t>##   mean_baseline   n
+## 1      26.31288 326</a:t>
+            </a:r>
+          </a:p>
+        </p:txBody>
+      </p:sp>
+    </p:spTree>
+  </p:cSld>
+</p:sld>
+</file>
+
+<file path=ppt/slides/slide19.xml><?xml version="1.0" encoding="utf-8"?>
+<p:sld xmlns:a="http://schemas.openxmlformats.org/drawingml/2006/main" xmlns:r="http://schemas.openxmlformats.org/officeDocument/2006/relationships" xmlns:p="http://schemas.openxmlformats.org/presentationml/2006/main">
+  <p:cSld>
+    <p:spTree>
+      <p:nvGrpSpPr>
+        <p:cNvPr id="1" name=""/>
+        <p:cNvGrpSpPr/>
+        <p:nvPr/>
+      </p:nvGrpSpPr>
+      <p:grpSpPr>
+        <a:xfrm>
+          <a:off x="0" y="0"/>
+          <a:ext cx="0" cy="0"/>
+          <a:chOff x="0" y="0"/>
+          <a:chExt cx="0" cy="0"/>
+        </a:xfrm>
+      </p:grpSpPr>
+      <p:sp>
+        <p:nvSpPr>
+          <p:cNvPr id="2" name="Title 1"/>
+          <p:cNvSpPr>
+            <a:spLocks noGrp="1"/>
+          </p:cNvSpPr>
+          <p:nvPr>
+            <p:ph type="title"/>
+          </p:nvPr>
+        </p:nvSpPr>
+        <p:spPr/>
+        <p:txBody>
+          <a:bodyPr/>
+          <a:lstStyle/>
+          <a:p>
+            <a:pPr lvl="0" marL="0" indent="0">
+              <a:buNone/>
+            </a:pPr>
+            <a:r>
+              <a:rPr/>
+              <a:t>Summary</a:t>
+            </a:r>
+          </a:p>
+        </p:txBody>
+      </p:sp>
+      <p:sp>
+        <p:nvSpPr>
+          <p:cNvPr id="3" name="Content Placeholder 2"/>
+          <p:cNvSpPr>
+            <a:spLocks noGrp="1"/>
+          </p:cNvSpPr>
+          <p:nvPr>
+            <p:ph idx="1"/>
+          </p:nvPr>
+        </p:nvSpPr>
+        <p:spPr/>
+        <p:txBody>
+          <a:bodyPr/>
+          <a:lstStyle/>
+          <a:p>
+            <a:pPr lvl="1"/>
+            <a:r>
+              <a:rPr/>
+              <a:t>Counts are very important</a:t>
+            </a:r>
+          </a:p>
+          <a:p>
+            <a:pPr lvl="2"/>
+            <a:r>
+              <a:rPr/>
+              <a:t>Before AND after joins</a:t>
+            </a:r>
+          </a:p>
+          <a:p>
+            <a:pPr lvl="1"/>
+            <a:r>
+              <a:rPr/>
+              <a:t>How to select ids of mismatched values</a:t>
+            </a:r>
+          </a:p>
+          <a:p>
+            <a:pPr lvl="1"/>
+            <a:r>
+              <a:rPr/>
+              <a:t>How to find mismatched category labels</a:t>
+            </a:r>
+          </a:p>
+          <a:p>
+            <a:pPr lvl="1"/>
+            <a:r>
+              <a:rPr/>
+              <a:t>How to compute change scores</a:t>
+            </a:r>
+          </a:p>
+          <a:p>
+            <a:pPr lvl="1"/>
+            <a:r>
+              <a:rPr/>
+              <a:t>Comparing averages of drop outs to others</a:t>
             </a:r>
           </a:p>
         </p:txBody>
@@ -9792,6 +10627,183 @@
             <a:r>
               <a:rPr/>
               <a:t>Many applications beyond the ones shown in this video</a:t>
+            </a:r>
+          </a:p>
+        </p:txBody>
+      </p:sp>
+    </p:spTree>
+  </p:cSld>
+</p:sld>
+</file>
+
+<file path=ppt/slides/slide20.xml><?xml version="1.0" encoding="utf-8"?>
+<p:sld xmlns:a="http://schemas.openxmlformats.org/drawingml/2006/main" xmlns:r="http://schemas.openxmlformats.org/officeDocument/2006/relationships" xmlns:p="http://schemas.openxmlformats.org/presentationml/2006/main">
+  <p:cSld>
+    <p:spTree>
+      <p:nvGrpSpPr>
+        <p:cNvPr id="1" name=""/>
+        <p:cNvGrpSpPr/>
+        <p:nvPr/>
+      </p:nvGrpSpPr>
+      <p:grpSpPr>
+        <a:xfrm>
+          <a:off x="0" y="0"/>
+          <a:ext cx="0" cy="0"/>
+          <a:chOff x="0" y="0"/>
+          <a:chExt cx="0" cy="0"/>
+        </a:xfrm>
+      </p:grpSpPr>
+      <p:sp>
+        <p:nvSpPr>
+          <p:cNvPr id="2" name="Title 1"/>
+          <p:cNvSpPr>
+            <a:spLocks noGrp="1"/>
+          </p:cNvSpPr>
+          <p:nvPr>
+            <p:ph type="title"/>
+          </p:nvPr>
+        </p:nvSpPr>
+        <p:spPr/>
+        <p:txBody>
+          <a:bodyPr/>
+          <a:lstStyle/>
+          <a:p>
+            <a:pPr lvl="0" marL="0" indent="0">
+              <a:buNone/>
+            </a:pPr>
+            <a:r>
+              <a:rPr/>
+              <a:t>Homework</a:t>
+            </a:r>
+            <a:r>
+              <a:rPr/>
+              <a:t> </a:t>
+            </a:r>
+            <a:r>
+              <a:rPr/>
+              <a:t>(1/2)</a:t>
+            </a:r>
+          </a:p>
+        </p:txBody>
+      </p:sp>
+      <p:sp>
+        <p:nvSpPr>
+          <p:cNvPr id="3" name="Content Placeholder 2"/>
+          <p:cNvSpPr>
+            <a:spLocks noGrp="1"/>
+          </p:cNvSpPr>
+          <p:nvPr>
+            <p:ph idx="1"/>
+          </p:nvPr>
+        </p:nvSpPr>
+        <p:spPr/>
+        <p:txBody>
+          <a:bodyPr/>
+          <a:lstStyle/>
+          <a:p>
+            <a:pPr lvl="1"/>
+            <a:r>
+              <a:rPr/>
+              <a:t>Use the same database used in this video. It is available as longitudinal_example_db.sqlite on the Canvas website or you can find it on the Insights platform.</a:t>
+            </a:r>
+          </a:p>
+          <a:p>
+            <a:pPr lvl="1"/>
+            <a:r>
+              <a:rPr/>
+              <a:t>Count the number of records after an inner join of baseline_table and year_one_table. Compare this to the number of records in the year_one_table.</a:t>
+            </a:r>
+          </a:p>
+        </p:txBody>
+      </p:sp>
+    </p:spTree>
+  </p:cSld>
+</p:sld>
+</file>
+
+<file path=ppt/slides/slide21.xml><?xml version="1.0" encoding="utf-8"?>
+<p:sld xmlns:a="http://schemas.openxmlformats.org/drawingml/2006/main" xmlns:r="http://schemas.openxmlformats.org/officeDocument/2006/relationships" xmlns:p="http://schemas.openxmlformats.org/presentationml/2006/main">
+  <p:cSld>
+    <p:spTree>
+      <p:nvGrpSpPr>
+        <p:cNvPr id="1" name=""/>
+        <p:cNvGrpSpPr/>
+        <p:nvPr/>
+      </p:nvGrpSpPr>
+      <p:grpSpPr>
+        <a:xfrm>
+          <a:off x="0" y="0"/>
+          <a:ext cx="0" cy="0"/>
+          <a:chOff x="0" y="0"/>
+          <a:chExt cx="0" cy="0"/>
+        </a:xfrm>
+      </p:grpSpPr>
+      <p:sp>
+        <p:nvSpPr>
+          <p:cNvPr id="2" name="Title 1"/>
+          <p:cNvSpPr>
+            <a:spLocks noGrp="1"/>
+          </p:cNvSpPr>
+          <p:nvPr>
+            <p:ph type="title"/>
+          </p:nvPr>
+        </p:nvSpPr>
+        <p:spPr/>
+        <p:txBody>
+          <a:bodyPr/>
+          <a:lstStyle/>
+          <a:p>
+            <a:pPr lvl="0" marL="0" indent="0">
+              <a:buNone/>
+            </a:pPr>
+            <a:r>
+              <a:rPr/>
+              <a:t>Homework</a:t>
+            </a:r>
+            <a:r>
+              <a:rPr/>
+              <a:t> </a:t>
+            </a:r>
+            <a:r>
+              <a:rPr/>
+              <a:t>(2/2)</a:t>
+            </a:r>
+          </a:p>
+        </p:txBody>
+      </p:sp>
+      <p:sp>
+        <p:nvSpPr>
+          <p:cNvPr id="3" name="Content Placeholder 2"/>
+          <p:cNvSpPr>
+            <a:spLocks noGrp="1"/>
+          </p:cNvSpPr>
+          <p:nvPr>
+            <p:ph idx="1"/>
+          </p:nvPr>
+        </p:nvSpPr>
+        <p:spPr/>
+        <p:txBody>
+          <a:bodyPr/>
+          <a:lstStyle/>
+          <a:p>
+            <a:pPr lvl="1"/>
+            <a:r>
+              <a:rPr/>
+              <a:t>Compute the average pk score at baseline, the average score at one year, and the average change score.</a:t>
+            </a:r>
+          </a:p>
+          <a:p>
+            <a:pPr lvl="1"/>
+            <a:r>
+              <a:rPr/>
+              <a:t>Find and list the two labels in migraine_table that do not correspond to any codes in demog_table.</a:t>
+            </a:r>
+          </a:p>
+          <a:p>
+            <a:pPr lvl="1"/>
+            <a:r>
+              <a:rPr/>
+              <a:t>Show that there are no unmatched labels or unmatched codes for group_table.</a:t>
             </a:r>
           </a:p>
         </p:txBody>

</xml_diff>